<commit_message>
Added Zhong's slide and Affy CEL parsing slide.
</commit_message>
<xml_diff>
--- a/project_management/open_meetings/ICR_WS_Meeting_2011_10_12.pptx
+++ b/project_management/open_meetings/ICR_WS_Meeting_2011_10_12.pptx
@@ -5,7 +5,7 @@
     <p:sldMasterId id="2147483648" r:id="rId1"/>
   </p:sldMasterIdLst>
   <p:notesMasterIdLst>
-    <p:notesMasterId r:id="rId11"/>
+    <p:notesMasterId r:id="rId13"/>
   </p:notesMasterIdLst>
   <p:sldIdLst>
     <p:sldId id="256" r:id="rId2"/>
@@ -16,7 +16,9 @@
     <p:sldId id="263" r:id="rId7"/>
     <p:sldId id="264" r:id="rId8"/>
     <p:sldId id="260" r:id="rId9"/>
-    <p:sldId id="261" r:id="rId10"/>
+    <p:sldId id="266" r:id="rId10"/>
+    <p:sldId id="265" r:id="rId11"/>
+    <p:sldId id="261" r:id="rId12"/>
   </p:sldIdLst>
   <p:sldSz cx="9144000" cy="6858000" type="screen4x3"/>
   <p:notesSz cx="6858000" cy="9144000"/>
@@ -201,7 +203,7 @@
             <a:fld id="{FE554C56-26C5-40AB-A8DF-3C22C1B17D8C}" type="datetimeFigureOut">
               <a:rPr lang="en-US" smtClean="0"/>
               <a:pPr/>
-              <a:t>10/11/11</a:t>
+              <a:t>10/12/11</a:t>
             </a:fld>
             <a:endParaRPr lang="en-US"/>
           </a:p>
@@ -672,7 +674,7 @@
             <a:fld id="{91F825FC-8BD8-459C-8E69-D029CECC4CF3}" type="datetimeFigureOut">
               <a:rPr lang="en-US" smtClean="0"/>
               <a:pPr/>
-              <a:t>10/11/11</a:t>
+              <a:t>10/12/11</a:t>
             </a:fld>
             <a:endParaRPr lang="en-US"/>
           </a:p>
@@ -873,7 +875,7 @@
             <a:fld id="{91F825FC-8BD8-459C-8E69-D029CECC4CF3}" type="datetimeFigureOut">
               <a:rPr lang="en-US" smtClean="0"/>
               <a:pPr/>
-              <a:t>10/11/11</a:t>
+              <a:t>10/12/11</a:t>
             </a:fld>
             <a:endParaRPr lang="en-US"/>
           </a:p>
@@ -1064,7 +1066,7 @@
             <a:fld id="{91F825FC-8BD8-459C-8E69-D029CECC4CF3}" type="datetimeFigureOut">
               <a:rPr lang="en-US" smtClean="0"/>
               <a:pPr/>
-              <a:t>10/11/11</a:t>
+              <a:t>10/12/11</a:t>
             </a:fld>
             <a:endParaRPr lang="en-US"/>
           </a:p>
@@ -1608,7 +1610,7 @@
             <a:fld id="{91F825FC-8BD8-459C-8E69-D029CECC4CF3}" type="datetimeFigureOut">
               <a:rPr lang="en-US" smtClean="0"/>
               <a:pPr/>
-              <a:t>10/11/11</a:t>
+              <a:t>10/12/11</a:t>
             </a:fld>
             <a:endParaRPr lang="en-US"/>
           </a:p>
@@ -2051,7 +2053,7 @@
             <a:fld id="{91F825FC-8BD8-459C-8E69-D029CECC4CF3}" type="datetimeFigureOut">
               <a:rPr lang="en-US" smtClean="0"/>
               <a:pPr/>
-              <a:t>10/11/11</a:t>
+              <a:t>10/12/11</a:t>
             </a:fld>
             <a:endParaRPr lang="en-US"/>
           </a:p>
@@ -2190,7 +2192,7 @@
             <a:fld id="{91F825FC-8BD8-459C-8E69-D029CECC4CF3}" type="datetimeFigureOut">
               <a:rPr lang="en-US" smtClean="0"/>
               <a:pPr/>
-              <a:t>10/11/11</a:t>
+              <a:t>10/12/11</a:t>
             </a:fld>
             <a:endParaRPr lang="en-US"/>
           </a:p>
@@ -2306,7 +2308,7 @@
             <a:fld id="{91F825FC-8BD8-459C-8E69-D029CECC4CF3}" type="datetimeFigureOut">
               <a:rPr lang="en-US" smtClean="0"/>
               <a:pPr/>
-              <a:t>10/11/11</a:t>
+              <a:t>10/12/11</a:t>
             </a:fld>
             <a:endParaRPr lang="en-US"/>
           </a:p>
@@ -2604,7 +2606,7 @@
             <a:fld id="{91F825FC-8BD8-459C-8E69-D029CECC4CF3}" type="datetimeFigureOut">
               <a:rPr lang="en-US" smtClean="0"/>
               <a:pPr/>
-              <a:t>10/11/11</a:t>
+              <a:t>10/12/11</a:t>
             </a:fld>
             <a:endParaRPr lang="en-US"/>
           </a:p>
@@ -2878,7 +2880,7 @@
             <a:fld id="{91F825FC-8BD8-459C-8E69-D029CECC4CF3}" type="datetimeFigureOut">
               <a:rPr lang="en-US" smtClean="0"/>
               <a:pPr/>
-              <a:t>10/11/11</a:t>
+              <a:t>10/12/11</a:t>
             </a:fld>
             <a:endParaRPr lang="en-US"/>
           </a:p>
@@ -3503,6 +3505,510 @@
 </p:sld>
 </file>
 
+<file path=ppt/slides/slide10.xml><?xml version="1.0" encoding="utf-8"?>
+<p:sld xmlns:a="http://schemas.openxmlformats.org/drawingml/2006/main" xmlns:r="http://schemas.openxmlformats.org/officeDocument/2006/relationships" xmlns:mc="http://schemas.openxmlformats.org/markup-compatibility/2006" xmlns:mv="urn:schemas-microsoft-com:mac:vml" xmlns:p="http://schemas.openxmlformats.org/presentationml/2006/main" mc:Ignorable="mv" mc:PreserveAttributes="mv:*">
+  <p:cSld>
+    <p:spTree>
+      <p:nvGrpSpPr>
+        <p:cNvPr id="1" name=""/>
+        <p:cNvGrpSpPr/>
+        <p:nvPr/>
+      </p:nvGrpSpPr>
+      <p:grpSpPr>
+        <a:xfrm>
+          <a:off x="0" y="0"/>
+          <a:ext cx="0" cy="0"/>
+          <a:chOff x="0" y="0"/>
+          <a:chExt cx="0" cy="0"/>
+        </a:xfrm>
+      </p:grpSpPr>
+      <p:sp>
+        <p:nvSpPr>
+          <p:cNvPr id="2" name="Title 1"/>
+          <p:cNvSpPr>
+            <a:spLocks noGrp="1"/>
+          </p:cNvSpPr>
+          <p:nvPr>
+            <p:ph type="title"/>
+          </p:nvPr>
+        </p:nvSpPr>
+        <p:spPr/>
+        <p:txBody>
+          <a:bodyPr/>
+          <a:lstStyle/>
+          <a:p>
+            <a:r>
+              <a:rPr lang="en-US" dirty="0">
+                <a:ea typeface="ＭＳ Ｐゴシック" pitchFamily="34" charset="-128"/>
+              </a:rPr>
+              <a:t>What’s New on </a:t>
+            </a:r>
+            <a:r>
+              <a:rPr lang="en-US" dirty="0" err="1">
+                <a:ea typeface="ＭＳ Ｐゴシック" pitchFamily="34" charset="-128"/>
+              </a:rPr>
+              <a:t>caArray</a:t>
+            </a:r>
+            <a:r>
+              <a:rPr lang="en-US" dirty="0">
+                <a:ea typeface="ＭＳ Ｐゴシック" pitchFamily="34" charset="-128"/>
+              </a:rPr>
+              <a:t> Support</a:t>
+            </a:r>
+            <a:endParaRPr lang="en-US" dirty="0"/>
+          </a:p>
+        </p:txBody>
+      </p:sp>
+      <p:sp>
+        <p:nvSpPr>
+          <p:cNvPr id="3" name="Content Placeholder 2"/>
+          <p:cNvSpPr>
+            <a:spLocks noGrp="1"/>
+          </p:cNvSpPr>
+          <p:nvPr>
+            <p:ph idx="1"/>
+          </p:nvPr>
+        </p:nvSpPr>
+        <p:spPr>
+          <a:xfrm>
+            <a:off x="457200" y="1570037"/>
+            <a:ext cx="8229600" cy="4525963"/>
+          </a:xfrm>
+        </p:spPr>
+        <p:txBody>
+          <a:bodyPr>
+            <a:normAutofit lnSpcReduction="10000"/>
+          </a:bodyPr>
+          <a:lstStyle/>
+          <a:p>
+            <a:pPr marL="495300" indent="-495300">
+              <a:lnSpc>
+                <a:spcPct val="90000"/>
+              </a:lnSpc>
+            </a:pPr>
+            <a:r>
+              <a:rPr lang="en-US" dirty="0" smtClean="0">
+                <a:ea typeface="ＭＳ Ｐゴシック" pitchFamily="34" charset="-128"/>
+              </a:rPr>
+              <a:t>New </a:t>
+            </a:r>
+            <a:r>
+              <a:rPr lang="en-US" dirty="0">
+                <a:ea typeface="ＭＳ Ｐゴシック" pitchFamily="34" charset="-128"/>
+              </a:rPr>
+              <a:t>Knowledgebase Articles</a:t>
+            </a:r>
+          </a:p>
+          <a:p>
+            <a:pPr marL="800100" lvl="1" indent="-342900">
+              <a:lnSpc>
+                <a:spcPct val="90000"/>
+              </a:lnSpc>
+            </a:pPr>
+            <a:r>
+              <a:rPr lang="en-US" dirty="0" smtClean="0">
+                <a:hlinkClick r:id="rId2"/>
+              </a:rPr>
+              <a:t>caArray080</a:t>
+            </a:r>
+            <a:r>
+              <a:rPr lang="en-US" dirty="0" smtClean="0"/>
+              <a:t> </a:t>
+            </a:r>
+            <a:r>
+              <a:rPr lang="en-US" dirty="0"/>
+              <a:t>A Step-by-Step Guide to Create a MAGE-TAB Template Specific to RPLA Project</a:t>
+            </a:r>
+            <a:endParaRPr lang="en-US" dirty="0" smtClean="0"/>
+          </a:p>
+          <a:p>
+            <a:pPr marL="800100" lvl="1" indent="-342900">
+              <a:lnSpc>
+                <a:spcPct val="90000"/>
+              </a:lnSpc>
+            </a:pPr>
+            <a:r>
+              <a:rPr lang="en-US" dirty="0" smtClean="0">
+                <a:hlinkClick r:id="rId3"/>
+              </a:rPr>
+              <a:t>caArray081</a:t>
+            </a:r>
+            <a:r>
+              <a:rPr lang="en-US" dirty="0" smtClean="0"/>
+              <a:t> Can </a:t>
+            </a:r>
+            <a:r>
+              <a:rPr lang="en-US" dirty="0" err="1"/>
+              <a:t>caArray</a:t>
+            </a:r>
+            <a:r>
+              <a:rPr lang="en-US" dirty="0"/>
+              <a:t> and caIntegrator2 share the same version of the UPT application?</a:t>
+            </a:r>
+            <a:endParaRPr lang="en-US" dirty="0" smtClean="0"/>
+          </a:p>
+          <a:p>
+            <a:pPr marL="800100" lvl="1" indent="-342900">
+              <a:lnSpc>
+                <a:spcPct val="90000"/>
+              </a:lnSpc>
+            </a:pPr>
+            <a:r>
+              <a:rPr lang="en-US" dirty="0" smtClean="0">
+                <a:hlinkClick r:id="rId4"/>
+              </a:rPr>
+              <a:t>caArray085</a:t>
+            </a:r>
+            <a:r>
+              <a:rPr lang="en-US" dirty="0" smtClean="0"/>
+              <a:t> </a:t>
+            </a:r>
+            <a:r>
+              <a:rPr lang="en-US" dirty="0"/>
+              <a:t>Which columns are required for an </a:t>
+            </a:r>
+            <a:r>
+              <a:rPr lang="en-US" dirty="0" err="1"/>
+              <a:t>Illumina</a:t>
+            </a:r>
+            <a:r>
+              <a:rPr lang="en-US" dirty="0"/>
+              <a:t> </a:t>
+            </a:r>
+            <a:r>
+              <a:rPr lang="en-US" dirty="0" err="1"/>
+              <a:t>csv</a:t>
+            </a:r>
+            <a:r>
+              <a:rPr lang="en-US" dirty="0"/>
+              <a:t> </a:t>
+            </a:r>
+            <a:r>
+              <a:rPr lang="en-US" dirty="0" err="1"/>
+              <a:t>datafile</a:t>
+            </a:r>
+            <a:r>
+              <a:rPr lang="en-US" dirty="0"/>
+              <a:t> and </a:t>
+            </a:r>
+            <a:r>
+              <a:rPr lang="en-US" dirty="0" err="1"/>
+              <a:t>caArray</a:t>
+            </a:r>
+            <a:r>
+              <a:rPr lang="en-US" dirty="0"/>
+              <a:t>?</a:t>
+            </a:r>
+            <a:r>
+              <a:rPr lang="en-US" b="1" dirty="0"/>
+              <a:t> </a:t>
+            </a:r>
+            <a:endParaRPr lang="en-US" dirty="0" smtClean="0">
+              <a:hlinkClick r:id="rId4"/>
+            </a:endParaRPr>
+          </a:p>
+          <a:p>
+            <a:pPr marL="800100" lvl="1" indent="-342900">
+              <a:lnSpc>
+                <a:spcPct val="90000"/>
+              </a:lnSpc>
+            </a:pPr>
+            <a:r>
+              <a:rPr lang="en-US" dirty="0" smtClean="0">
+                <a:hlinkClick r:id="rId4"/>
+              </a:rPr>
+              <a:t>caArray086</a:t>
+            </a:r>
+            <a:r>
+              <a:rPr lang="en-US" dirty="0" smtClean="0"/>
+              <a:t> </a:t>
+            </a:r>
+            <a:r>
+              <a:rPr lang="en-US" dirty="0"/>
+              <a:t>UPT was installed successfully but I could not log in as the super user. Why</a:t>
+            </a:r>
+            <a:r>
+              <a:rPr lang="en-US" dirty="0" smtClean="0"/>
+              <a:t>?</a:t>
+            </a:r>
+          </a:p>
+          <a:p>
+            <a:pPr marL="800100" lvl="1" indent="-342900">
+              <a:lnSpc>
+                <a:spcPct val="90000"/>
+              </a:lnSpc>
+            </a:pPr>
+            <a:r>
+              <a:rPr lang="en-US" dirty="0" smtClean="0">
+                <a:hlinkClick r:id="rId5"/>
+              </a:rPr>
+              <a:t>caArray087</a:t>
+            </a:r>
+            <a:r>
+              <a:rPr lang="en-US" dirty="0" smtClean="0"/>
+              <a:t> </a:t>
+            </a:r>
+            <a:r>
+              <a:rPr lang="en-US" dirty="0"/>
+              <a:t>Why Do I Get an Error Message When Attempting to </a:t>
+            </a:r>
+            <a:r>
+              <a:rPr lang="en-US" dirty="0" smtClean="0"/>
+              <a:t>Validate </a:t>
+            </a:r>
+            <a:r>
+              <a:rPr lang="en-US" dirty="0"/>
+              <a:t>an </a:t>
+            </a:r>
+            <a:r>
+              <a:rPr lang="en-US" dirty="0" err="1"/>
+              <a:t>Illumina</a:t>
+            </a:r>
+            <a:r>
+              <a:rPr lang="en-US" dirty="0"/>
+              <a:t> SNP Data File in </a:t>
+            </a:r>
+            <a:r>
+              <a:rPr lang="en-US" dirty="0" err="1"/>
+              <a:t>caArray</a:t>
+            </a:r>
+            <a:r>
+              <a:rPr lang="en-US" dirty="0" smtClean="0"/>
+              <a:t>?</a:t>
+            </a:r>
+          </a:p>
+          <a:p>
+            <a:pPr marL="400050">
+              <a:lnSpc>
+                <a:spcPct val="90000"/>
+              </a:lnSpc>
+            </a:pPr>
+            <a:r>
+              <a:rPr lang="en-US" dirty="0"/>
+              <a:t>Important Notice on Using UPT to Create Groups for </a:t>
+            </a:r>
+            <a:r>
+              <a:rPr lang="en-US" dirty="0" err="1" smtClean="0"/>
+              <a:t>caArray</a:t>
+            </a:r>
+            <a:endParaRPr lang="en-US" smtClean="0"/>
+          </a:p>
+          <a:p>
+            <a:pPr marL="800100" lvl="1">
+              <a:lnSpc>
+                <a:spcPct val="90000"/>
+              </a:lnSpc>
+            </a:pPr>
+            <a:r>
+              <a:rPr lang="en-US" smtClean="0"/>
+              <a:t>Do </a:t>
+            </a:r>
+            <a:r>
+              <a:rPr lang="en-US" dirty="0" smtClean="0"/>
+              <a:t>NOT </a:t>
+            </a:r>
+            <a:r>
+              <a:rPr lang="en-US" dirty="0"/>
+              <a:t>use protection elements or protection groups directly within </a:t>
+            </a:r>
+            <a:r>
+              <a:rPr lang="en-US" dirty="0" smtClean="0"/>
+              <a:t>UPT</a:t>
+            </a:r>
+          </a:p>
+          <a:p>
+            <a:pPr marL="800100" lvl="1">
+              <a:lnSpc>
+                <a:spcPct val="90000"/>
+              </a:lnSpc>
+            </a:pPr>
+            <a:r>
+              <a:rPr lang="en-US" dirty="0" smtClean="0"/>
+              <a:t>Do NOT create </a:t>
+            </a:r>
+            <a:r>
+              <a:rPr lang="en-US" dirty="0" err="1"/>
+              <a:t>caArray</a:t>
+            </a:r>
+            <a:r>
+              <a:rPr lang="en-US" dirty="0"/>
+              <a:t> collaboration groups within UPT. </a:t>
+            </a:r>
+            <a:endParaRPr lang="en-US" dirty="0" smtClean="0"/>
+          </a:p>
+          <a:p>
+            <a:pPr marL="800100" lvl="1">
+              <a:lnSpc>
+                <a:spcPct val="90000"/>
+              </a:lnSpc>
+            </a:pPr>
+            <a:r>
+              <a:rPr lang="en-US" dirty="0" smtClean="0"/>
+              <a:t>Doing </a:t>
+            </a:r>
+            <a:r>
+              <a:rPr lang="en-US" dirty="0"/>
+              <a:t>so may result in irreversible changes to the data in </a:t>
+            </a:r>
+            <a:r>
+              <a:rPr lang="en-US" dirty="0" err="1" smtClean="0"/>
+              <a:t>caArray</a:t>
+            </a:r>
+            <a:r>
+              <a:rPr lang="en-US" dirty="0" smtClean="0"/>
+              <a:t> </a:t>
+            </a:r>
+            <a:r>
+              <a:rPr lang="en-US" dirty="0"/>
+              <a:t>database, and will require reinstallation of </a:t>
+            </a:r>
+            <a:r>
+              <a:rPr lang="en-US" dirty="0" err="1"/>
+              <a:t>caArray</a:t>
+            </a:r>
+            <a:endParaRPr lang="en-US" dirty="0" smtClean="0"/>
+          </a:p>
+          <a:p>
+            <a:pPr>
+              <a:spcBef>
+                <a:spcPts val="600"/>
+              </a:spcBef>
+              <a:spcAft>
+                <a:spcPts val="200"/>
+              </a:spcAft>
+            </a:pPr>
+            <a:endParaRPr lang="en-US" sz="2000" dirty="0"/>
+          </a:p>
+        </p:txBody>
+      </p:sp>
+    </p:spTree>
+  </p:cSld>
+  <p:clrMapOvr>
+    <a:masterClrMapping/>
+  </p:clrMapOvr>
+</p:sld>
+</file>
+
+<file path=ppt/slides/slide11.xml><?xml version="1.0" encoding="utf-8"?>
+<p:sld xmlns:a="http://schemas.openxmlformats.org/drawingml/2006/main" xmlns:r="http://schemas.openxmlformats.org/officeDocument/2006/relationships" xmlns:mc="http://schemas.openxmlformats.org/markup-compatibility/2006" xmlns:mv="urn:schemas-microsoft-com:mac:vml" xmlns:p="http://schemas.openxmlformats.org/presentationml/2006/main" mc:Ignorable="mv" mc:PreserveAttributes="mv:*">
+  <p:cSld>
+    <p:spTree>
+      <p:nvGrpSpPr>
+        <p:cNvPr id="1" name=""/>
+        <p:cNvGrpSpPr/>
+        <p:nvPr/>
+      </p:nvGrpSpPr>
+      <p:grpSpPr>
+        <a:xfrm>
+          <a:off x="0" y="0"/>
+          <a:ext cx="0" cy="0"/>
+          <a:chOff x="0" y="0"/>
+          <a:chExt cx="0" cy="0"/>
+        </a:xfrm>
+      </p:grpSpPr>
+      <p:sp>
+        <p:nvSpPr>
+          <p:cNvPr id="2" name="Title 1"/>
+          <p:cNvSpPr>
+            <a:spLocks noGrp="1"/>
+          </p:cNvSpPr>
+          <p:nvPr>
+            <p:ph type="title"/>
+          </p:nvPr>
+        </p:nvSpPr>
+        <p:spPr/>
+        <p:txBody>
+          <a:bodyPr/>
+          <a:lstStyle/>
+          <a:p>
+            <a:r>
+              <a:rPr lang="en-US" dirty="0" smtClean="0"/>
+              <a:t>Avenue for Feedback</a:t>
+            </a:r>
+            <a:endParaRPr lang="en-US" dirty="0"/>
+          </a:p>
+        </p:txBody>
+      </p:sp>
+      <p:sp>
+        <p:nvSpPr>
+          <p:cNvPr id="3" name="Content Placeholder 2"/>
+          <p:cNvSpPr>
+            <a:spLocks noGrp="1"/>
+          </p:cNvSpPr>
+          <p:nvPr>
+            <p:ph idx="1"/>
+          </p:nvPr>
+        </p:nvSpPr>
+        <p:spPr>
+          <a:xfrm>
+            <a:off x="457200" y="1570037"/>
+            <a:ext cx="8229600" cy="4525963"/>
+          </a:xfrm>
+        </p:spPr>
+        <p:txBody>
+          <a:bodyPr>
+            <a:normAutofit/>
+          </a:bodyPr>
+          <a:lstStyle/>
+          <a:p>
+            <a:pPr>
+              <a:spcBef>
+                <a:spcPts val="600"/>
+              </a:spcBef>
+              <a:spcAft>
+                <a:spcPts val="200"/>
+              </a:spcAft>
+            </a:pPr>
+            <a:r>
+              <a:rPr lang="en-US" sz="2000" dirty="0" smtClean="0"/>
+              <a:t>We welcome feedback on caArray</a:t>
+            </a:r>
+          </a:p>
+          <a:p>
+            <a:pPr lvl="1">
+              <a:spcBef>
+                <a:spcPts val="600"/>
+              </a:spcBef>
+              <a:spcAft>
+                <a:spcPts val="200"/>
+              </a:spcAft>
+            </a:pPr>
+            <a:r>
+              <a:rPr lang="en-US" sz="2000" dirty="0" smtClean="0"/>
+              <a:t>Molecular Analysis Tools Knowledge Center Forum: </a:t>
+            </a:r>
+            <a:r>
+              <a:rPr lang="en-US" sz="2000" dirty="0" smtClean="0">
+                <a:hlinkClick r:id="rId2"/>
+              </a:rPr>
+              <a:t>https://cabig-kc.nci.nih.gov/Molecular/forums/</a:t>
+            </a:r>
+            <a:r>
+              <a:rPr lang="en-US" sz="2000" dirty="0" smtClean="0"/>
+              <a:t> </a:t>
+            </a:r>
+          </a:p>
+          <a:p>
+            <a:pPr>
+              <a:spcBef>
+                <a:spcPts val="600"/>
+              </a:spcBef>
+              <a:spcAft>
+                <a:spcPts val="200"/>
+              </a:spcAft>
+            </a:pPr>
+            <a:endParaRPr lang="en-US" sz="2000" dirty="0" smtClean="0"/>
+          </a:p>
+        </p:txBody>
+      </p:sp>
+    </p:spTree>
+  </p:cSld>
+  <p:clrMapOvr>
+    <a:masterClrMapping/>
+  </p:clrMapOvr>
+</p:sld>
+</file>
+
 <file path=ppt/slides/slide2.xml><?xml version="1.0" encoding="utf-8"?>
 <p:sld xmlns:a="http://schemas.openxmlformats.org/drawingml/2006/main" xmlns:r="http://schemas.openxmlformats.org/officeDocument/2006/relationships" xmlns:mc="http://schemas.openxmlformats.org/markup-compatibility/2006" xmlns:mv="urn:schemas-microsoft-com:mac:vml" xmlns:p="http://schemas.openxmlformats.org/presentationml/2006/main" mc:Ignorable="mv" mc:PreserveAttributes="mv:*">
   <p:cSld>
@@ -3809,11 +4315,7 @@
           <a:p>
             <a:r>
               <a:rPr lang="en-US" dirty="0" smtClean="0"/>
-              <a:t>Demo of caArray </a:t>
-            </a:r>
-            <a:r>
-              <a:rPr lang="en-US" dirty="0" smtClean="0"/>
-              <a:t>2.4.1</a:t>
+              <a:t>Demo of caArray 2.4.1</a:t>
             </a:r>
             <a:endParaRPr lang="en-US" dirty="0"/>
           </a:p>
@@ -4365,6 +4867,17 @@
               <a:t>)</a:t>
             </a:r>
           </a:p>
+          <a:p>
+            <a:pPr lvl="1">
+              <a:spcBef>
+                <a:spcPts val="600"/>
+              </a:spcBef>
+              <a:spcAft>
+                <a:spcPts val="200"/>
+              </a:spcAft>
+            </a:pPr>
+            <a:endParaRPr lang="en-US" sz="2000" dirty="0" smtClean="0"/>
+          </a:p>
         </p:txBody>
       </p:sp>
     </p:spTree>
@@ -4409,7 +4922,7 @@
           <a:p>
             <a:r>
               <a:rPr lang="en-US" dirty="0" smtClean="0"/>
-              <a:t>Avenue for Feedback</a:t>
+              <a:t>Data Parsing in 2.5.0</a:t>
             </a:r>
             <a:endParaRPr lang="en-US" dirty="0"/>
           </a:p>
@@ -4447,7 +4960,7 @@
             </a:pPr>
             <a:r>
               <a:rPr lang="en-US" sz="2000" dirty="0" smtClean="0"/>
-              <a:t>We welcome feedback on caArray</a:t>
+              <a:t>Disable Affymetrix CEL file parsing and store files as-is?</a:t>
             </a:r>
           </a:p>
           <a:p>
@@ -4460,28 +4973,68 @@
               </a:spcAft>
             </a:pPr>
             <a:r>
+              <a:rPr lang="en-US" sz="2000" dirty="0" smtClean="0">
+                <a:solidFill>
+                  <a:srgbClr val="0000FF"/>
+                </a:solidFill>
+              </a:rPr>
+              <a:t>Pros:</a:t>
+            </a:r>
+            <a:r>
               <a:rPr lang="en-US" sz="2000" dirty="0" smtClean="0"/>
-              <a:t>Molecular Analysis Tools Knowledge Center Forum: </a:t>
-            </a:r>
+              <a:t> Faster import; less database space usage.</a:t>
+            </a:r>
+          </a:p>
+          <a:p>
+            <a:pPr lvl="1">
+              <a:spcBef>
+                <a:spcPts val="600"/>
+              </a:spcBef>
+              <a:spcAft>
+                <a:spcPts val="200"/>
+              </a:spcAft>
+            </a:pPr>
             <a:r>
               <a:rPr lang="en-US" sz="2000" dirty="0" smtClean="0">
-                <a:hlinkClick r:id="rId2"/>
+                <a:solidFill>
+                  <a:srgbClr val="0000FF"/>
+                </a:solidFill>
               </a:rPr>
-              <a:t>https://cabig-kc.nci.nih.gov/Molecular/forums</a:t>
-            </a:r>
+              <a:t>Cons:</a:t>
+            </a:r>
+            <a:r>
+              <a:rPr lang="en-US" sz="2000" dirty="0" smtClean="0"/>
+              <a:t> Client applications needing raw signal values will have to </a:t>
+            </a:r>
+            <a:r>
+              <a:rPr lang="en-US" sz="2000" dirty="0" smtClean="0"/>
+              <a:t>download the CEL file from caArray and parse it themselves.</a:t>
+            </a:r>
+          </a:p>
+          <a:p>
+            <a:pPr lvl="1">
+              <a:spcBef>
+                <a:spcPts val="600"/>
+              </a:spcBef>
+              <a:spcAft>
+                <a:spcPts val="200"/>
+              </a:spcAft>
+            </a:pPr>
             <a:r>
               <a:rPr lang="en-US" sz="2000" dirty="0" smtClean="0">
-                <a:hlinkClick r:id="rId2"/>
+                <a:solidFill>
+                  <a:srgbClr val="0000FF"/>
+                </a:solidFill>
               </a:rPr>
-              <a:t>/</a:t>
+              <a:t>Note:</a:t>
             </a:r>
             <a:r>
               <a:rPr lang="en-US" sz="2000" dirty="0" smtClean="0"/>
-              <a:t> </a:t>
-            </a:r>
-          </a:p>
-          <a:p>
-            <a:pPr>
+              <a:t> Affymetrix CHP files will continue to be parsed.</a:t>
+            </a:r>
+          </a:p>
+          <a:p>
+            <a:pPr lvl="1">
               <a:spcBef>
                 <a:spcPts val="600"/>
               </a:spcBef>

</xml_diff>